<commit_message>
Complete general search bar
</commit_message>
<xml_diff>
--- a/Tutorial.pptx
+++ b/Tutorial.pptx
@@ -112,6 +112,11 @@
       </a:defRPr>
     </a:lvl9pPr>
   </p:defaultTextStyle>
+  <p:extLst>
+    <p:ext uri="{EFAFB233-063F-42B5-8137-9DF3F51BA10A}">
+      <p15:sldGuideLst xmlns:p15="http://schemas.microsoft.com/office/powerpoint/2012/main"/>
+    </p:ext>
+  </p:extLst>
 </p:presentation>
 </file>
 
@@ -263,7 +268,7 @@
           <a:lstStyle/>
           <a:p>
             <a:fld id="{32055241-53B9-BB4E-A174-A7F7AFEF4BBD}" type="datetimeFigureOut">
-              <a:t>30/04/2024</a:t>
+              <a:t>15/05/2024</a:t>
             </a:fld>
             <a:endParaRPr lang="en-DK"/>
           </a:p>
@@ -461,7 +466,7 @@
           <a:lstStyle/>
           <a:p>
             <a:fld id="{32055241-53B9-BB4E-A174-A7F7AFEF4BBD}" type="datetimeFigureOut">
-              <a:t>30/04/2024</a:t>
+              <a:t>15/05/2024</a:t>
             </a:fld>
             <a:endParaRPr lang="en-DK"/>
           </a:p>
@@ -669,7 +674,7 @@
           <a:lstStyle/>
           <a:p>
             <a:fld id="{32055241-53B9-BB4E-A174-A7F7AFEF4BBD}" type="datetimeFigureOut">
-              <a:t>30/04/2024</a:t>
+              <a:t>15/05/2024</a:t>
             </a:fld>
             <a:endParaRPr lang="en-DK"/>
           </a:p>
@@ -867,7 +872,7 @@
           <a:lstStyle/>
           <a:p>
             <a:fld id="{32055241-53B9-BB4E-A174-A7F7AFEF4BBD}" type="datetimeFigureOut">
-              <a:t>30/04/2024</a:t>
+              <a:t>15/05/2024</a:t>
             </a:fld>
             <a:endParaRPr lang="en-DK"/>
           </a:p>
@@ -1141,7 +1146,7 @@
           <a:lstStyle/>
           <a:p>
             <a:fld id="{32055241-53B9-BB4E-A174-A7F7AFEF4BBD}" type="datetimeFigureOut">
-              <a:t>30/04/2024</a:t>
+              <a:t>15/05/2024</a:t>
             </a:fld>
             <a:endParaRPr lang="en-DK"/>
           </a:p>
@@ -1407,7 +1412,7 @@
           <a:lstStyle/>
           <a:p>
             <a:fld id="{32055241-53B9-BB4E-A174-A7F7AFEF4BBD}" type="datetimeFigureOut">
-              <a:t>30/04/2024</a:t>
+              <a:t>15/05/2024</a:t>
             </a:fld>
             <a:endParaRPr lang="en-DK"/>
           </a:p>
@@ -1820,7 +1825,7 @@
           <a:lstStyle/>
           <a:p>
             <a:fld id="{32055241-53B9-BB4E-A174-A7F7AFEF4BBD}" type="datetimeFigureOut">
-              <a:t>30/04/2024</a:t>
+              <a:t>15/05/2024</a:t>
             </a:fld>
             <a:endParaRPr lang="en-DK"/>
           </a:p>
@@ -1960,7 +1965,7 @@
           <a:lstStyle/>
           <a:p>
             <a:fld id="{32055241-53B9-BB4E-A174-A7F7AFEF4BBD}" type="datetimeFigureOut">
-              <a:t>30/04/2024</a:t>
+              <a:t>15/05/2024</a:t>
             </a:fld>
             <a:endParaRPr lang="en-DK"/>
           </a:p>
@@ -2071,7 +2076,7 @@
           <a:lstStyle/>
           <a:p>
             <a:fld id="{32055241-53B9-BB4E-A174-A7F7AFEF4BBD}" type="datetimeFigureOut">
-              <a:t>30/04/2024</a:t>
+              <a:t>15/05/2024</a:t>
             </a:fld>
             <a:endParaRPr lang="en-DK"/>
           </a:p>
@@ -2382,7 +2387,7 @@
           <a:lstStyle/>
           <a:p>
             <a:fld id="{32055241-53B9-BB4E-A174-A7F7AFEF4BBD}" type="datetimeFigureOut">
-              <a:t>30/04/2024</a:t>
+              <a:t>15/05/2024</a:t>
             </a:fld>
             <a:endParaRPr lang="en-DK"/>
           </a:p>
@@ -2669,7 +2674,7 @@
           <a:lstStyle/>
           <a:p>
             <a:fld id="{32055241-53B9-BB4E-A174-A7F7AFEF4BBD}" type="datetimeFigureOut">
-              <a:t>30/04/2024</a:t>
+              <a:t>15/05/2024</a:t>
             </a:fld>
             <a:endParaRPr lang="en-DK"/>
           </a:p>
@@ -2910,7 +2915,7 @@
           </a:lstStyle>
           <a:p>
             <a:fld id="{32055241-53B9-BB4E-A174-A7F7AFEF4BBD}" type="datetimeFigureOut">
-              <a:t>30/04/2024</a:t>
+              <a:t>15/05/2024</a:t>
             </a:fld>
             <a:endParaRPr lang="en-DK"/>
           </a:p>
@@ -3970,12 +3975,160 @@
           <a:chExt cx="0" cy="0"/>
         </a:xfrm>
       </p:grpSpPr>
+      <p:sp>
+        <p:nvSpPr>
+          <p:cNvPr id="4" name="TextBox 3">
+            <a:extLst>
+              <a:ext uri="{FF2B5EF4-FFF2-40B4-BE49-F238E27FC236}">
+                <a16:creationId xmlns:a16="http://schemas.microsoft.com/office/drawing/2014/main" id="{D439A001-75F9-5B52-A4B0-CBC7306BA498}"/>
+              </a:ext>
+            </a:extLst>
+          </p:cNvPr>
+          <p:cNvSpPr txBox="1"/>
+          <p:nvPr/>
+        </p:nvSpPr>
+        <p:spPr>
+          <a:xfrm>
+            <a:off x="2477813" y="5228021"/>
+            <a:ext cx="4125311" cy="1200329"/>
+          </a:xfrm>
+          <a:prstGeom prst="rect">
+            <a:avLst/>
+          </a:prstGeom>
+          <a:noFill/>
+          <a:ln>
+            <a:solidFill>
+              <a:srgbClr val="C00000"/>
+            </a:solidFill>
+          </a:ln>
+        </p:spPr>
+        <p:txBody>
+          <a:bodyPr wrap="square" rtlCol="0">
+            <a:spAutoFit/>
+          </a:bodyPr>
+          <a:lstStyle/>
+          <a:p>
+            <a:r>
+              <a:rPr lang="en-DK">
+                <a:solidFill>
+                  <a:srgbClr val="C00000"/>
+                </a:solidFill>
+              </a:rPr>
+              <a:t>A drug can have no, one or more than one assigned ATC code. Click here to open the ATC code network for more detailed information</a:t>
+            </a:r>
+          </a:p>
+        </p:txBody>
+      </p:sp>
+      <p:sp>
+        <p:nvSpPr>
+          <p:cNvPr id="7" name="TextBox 6">
+            <a:extLst>
+              <a:ext uri="{FF2B5EF4-FFF2-40B4-BE49-F238E27FC236}">
+                <a16:creationId xmlns:a16="http://schemas.microsoft.com/office/drawing/2014/main" id="{AAEE22A6-51DA-6136-8693-D0C7CF0C39C2}"/>
+              </a:ext>
+            </a:extLst>
+          </p:cNvPr>
+          <p:cNvSpPr txBox="1"/>
+          <p:nvPr/>
+        </p:nvSpPr>
+        <p:spPr>
+          <a:xfrm>
+            <a:off x="8266795" y="5333562"/>
+            <a:ext cx="2519855" cy="646331"/>
+          </a:xfrm>
+          <a:prstGeom prst="rect">
+            <a:avLst/>
+          </a:prstGeom>
+          <a:noFill/>
+          <a:ln>
+            <a:solidFill>
+              <a:srgbClr val="C00000"/>
+            </a:solidFill>
+          </a:ln>
+        </p:spPr>
+        <p:txBody>
+          <a:bodyPr wrap="square" rtlCol="0">
+            <a:spAutoFit/>
+          </a:bodyPr>
+          <a:lstStyle/>
+          <a:p>
+            <a:r>
+              <a:rPr lang="en-DK">
+                <a:solidFill>
+                  <a:srgbClr val="C00000"/>
+                </a:solidFill>
+              </a:rPr>
+              <a:t>Click here to see drug adverse reaction</a:t>
+            </a:r>
+          </a:p>
+        </p:txBody>
+      </p:sp>
+      <p:sp>
+        <p:nvSpPr>
+          <p:cNvPr id="15" name="TextBox 14">
+            <a:extLst>
+              <a:ext uri="{FF2B5EF4-FFF2-40B4-BE49-F238E27FC236}">
+                <a16:creationId xmlns:a16="http://schemas.microsoft.com/office/drawing/2014/main" id="{007D3E2D-F941-3048-A2F5-06CF6EB8D6C5}"/>
+              </a:ext>
+            </a:extLst>
+          </p:cNvPr>
+          <p:cNvSpPr txBox="1"/>
+          <p:nvPr/>
+        </p:nvSpPr>
+        <p:spPr>
+          <a:xfrm>
+            <a:off x="4162097" y="559068"/>
+            <a:ext cx="5364626" cy="923330"/>
+          </a:xfrm>
+          <a:prstGeom prst="rect">
+            <a:avLst/>
+          </a:prstGeom>
+          <a:noFill/>
+          <a:ln>
+            <a:solidFill>
+              <a:srgbClr val="C00000"/>
+            </a:solidFill>
+          </a:ln>
+        </p:spPr>
+        <p:txBody>
+          <a:bodyPr wrap="square" rtlCol="0">
+            <a:spAutoFit/>
+          </a:bodyPr>
+          <a:lstStyle/>
+          <a:p>
+            <a:r>
+              <a:rPr lang="en-DK">
+                <a:solidFill>
+                  <a:srgbClr val="C00000"/>
+                </a:solidFill>
+              </a:rPr>
+              <a:t>Use this search box to find a drug from its Drugbank ID or name. </a:t>
+            </a:r>
+            <a:r>
+              <a:rPr lang="vi-VN">
+                <a:solidFill>
+                  <a:srgbClr val="C00000"/>
+                </a:solidFill>
+              </a:rPr>
+              <a:t>Autocomplete feature suggests possible matches as the user types.</a:t>
+            </a:r>
+            <a:r>
+              <a:rPr lang="en-DK">
+                <a:solidFill>
+                  <a:srgbClr val="C00000"/>
+                </a:solidFill>
+              </a:rPr>
+              <a:t> </a:t>
+            </a:r>
+          </a:p>
+        </p:txBody>
+      </p:sp>
       <p:pic>
         <p:nvPicPr>
-          <p:cNvPr id="3" name="Picture 2" descr="A screenshot of a computer&#10;&#10;Description automatically generated">
-            <a:extLst>
-              <a:ext uri="{FF2B5EF4-FFF2-40B4-BE49-F238E27FC236}">
-                <a16:creationId xmlns:a16="http://schemas.microsoft.com/office/drawing/2014/main" id="{2B25C831-DCFE-0654-A852-5E04CE57E87E}"/>
+          <p:cNvPr id="2" name="Picture 1">
+            <a:extLst>
+              <a:ext uri="{FF2B5EF4-FFF2-40B4-BE49-F238E27FC236}">
+                <a16:creationId xmlns:a16="http://schemas.microsoft.com/office/drawing/2014/main" id="{06B6D78C-6E01-B405-DF9D-28351E8EF202}"/>
               </a:ext>
             </a:extLst>
           </p:cNvPr>
@@ -3992,20 +4145,152 @@
         </p:blipFill>
         <p:spPr>
           <a:xfrm>
-            <a:off x="1026482" y="1629979"/>
-            <a:ext cx="10139035" cy="2805386"/>
+            <a:off x="1612284" y="1524438"/>
+            <a:ext cx="8489209" cy="3512533"/>
           </a:xfrm>
           <a:prstGeom prst="rect">
             <a:avLst/>
           </a:prstGeom>
         </p:spPr>
       </p:pic>
-      <p:sp>
-        <p:nvSpPr>
-          <p:cNvPr id="4" name="TextBox 3">
-            <a:extLst>
-              <a:ext uri="{FF2B5EF4-FFF2-40B4-BE49-F238E27FC236}">
-                <a16:creationId xmlns:a16="http://schemas.microsoft.com/office/drawing/2014/main" id="{D439A001-75F9-5B52-A4B0-CBC7306BA498}"/>
+      <p:cxnSp>
+        <p:nvCxnSpPr>
+          <p:cNvPr id="11" name="Straight Arrow Connector 10">
+            <a:extLst>
+              <a:ext uri="{FF2B5EF4-FFF2-40B4-BE49-F238E27FC236}">
+                <a16:creationId xmlns:a16="http://schemas.microsoft.com/office/drawing/2014/main" id="{D754D501-FF05-FDBD-8B7F-AAC0F675C34B}"/>
+              </a:ext>
+            </a:extLst>
+          </p:cNvPr>
+          <p:cNvCxnSpPr>
+            <a:cxnSpLocks/>
+          </p:cNvCxnSpPr>
+          <p:nvPr/>
+        </p:nvCxnSpPr>
+        <p:spPr>
+          <a:xfrm flipH="1">
+            <a:off x="3657600" y="1418897"/>
+            <a:ext cx="504497" cy="746234"/>
+          </a:xfrm>
+          <a:prstGeom prst="straightConnector1">
+            <a:avLst/>
+          </a:prstGeom>
+          <a:ln>
+            <a:solidFill>
+              <a:srgbClr val="C00000"/>
+            </a:solidFill>
+            <a:tailEnd type="triangle"/>
+          </a:ln>
+        </p:spPr>
+        <p:style>
+          <a:lnRef idx="2">
+            <a:schemeClr val="accent1"/>
+          </a:lnRef>
+          <a:fillRef idx="0">
+            <a:schemeClr val="accent1"/>
+          </a:fillRef>
+          <a:effectRef idx="1">
+            <a:schemeClr val="accent1"/>
+          </a:effectRef>
+          <a:fontRef idx="minor">
+            <a:schemeClr val="tx1"/>
+          </a:fontRef>
+        </p:style>
+      </p:cxnSp>
+      <p:cxnSp>
+        <p:nvCxnSpPr>
+          <p:cNvPr id="5" name="Straight Arrow Connector 4">
+            <a:extLst>
+              <a:ext uri="{FF2B5EF4-FFF2-40B4-BE49-F238E27FC236}">
+                <a16:creationId xmlns:a16="http://schemas.microsoft.com/office/drawing/2014/main" id="{E9BB30B9-440D-5567-AC7A-BEE6E03E1326}"/>
+              </a:ext>
+            </a:extLst>
+          </p:cNvPr>
+          <p:cNvCxnSpPr>
+            <a:cxnSpLocks/>
+          </p:cNvCxnSpPr>
+          <p:nvPr/>
+        </p:nvCxnSpPr>
+        <p:spPr>
+          <a:xfrm flipV="1">
+            <a:off x="3870435" y="4692870"/>
+            <a:ext cx="670033" cy="535151"/>
+          </a:xfrm>
+          <a:prstGeom prst="straightConnector1">
+            <a:avLst/>
+          </a:prstGeom>
+          <a:ln>
+            <a:solidFill>
+              <a:srgbClr val="C00000"/>
+            </a:solidFill>
+            <a:tailEnd type="triangle"/>
+          </a:ln>
+        </p:spPr>
+        <p:style>
+          <a:lnRef idx="2">
+            <a:schemeClr val="accent1"/>
+          </a:lnRef>
+          <a:fillRef idx="0">
+            <a:schemeClr val="accent1"/>
+          </a:fillRef>
+          <a:effectRef idx="1">
+            <a:schemeClr val="accent1"/>
+          </a:effectRef>
+          <a:fontRef idx="minor">
+            <a:schemeClr val="tx1"/>
+          </a:fontRef>
+        </p:style>
+      </p:cxnSp>
+      <p:cxnSp>
+        <p:nvCxnSpPr>
+          <p:cNvPr id="8" name="Straight Arrow Connector 7">
+            <a:extLst>
+              <a:ext uri="{FF2B5EF4-FFF2-40B4-BE49-F238E27FC236}">
+                <a16:creationId xmlns:a16="http://schemas.microsoft.com/office/drawing/2014/main" id="{CF791697-F91A-66F0-0660-BD07ABCDE8AF}"/>
+              </a:ext>
+            </a:extLst>
+          </p:cNvPr>
+          <p:cNvCxnSpPr>
+            <a:cxnSpLocks/>
+          </p:cNvCxnSpPr>
+          <p:nvPr/>
+        </p:nvCxnSpPr>
+        <p:spPr>
+          <a:xfrm flipH="1" flipV="1">
+            <a:off x="9045205" y="4849648"/>
+            <a:ext cx="298492" cy="483914"/>
+          </a:xfrm>
+          <a:prstGeom prst="straightConnector1">
+            <a:avLst/>
+          </a:prstGeom>
+          <a:ln>
+            <a:solidFill>
+              <a:srgbClr val="C00000"/>
+            </a:solidFill>
+            <a:tailEnd type="triangle"/>
+          </a:ln>
+        </p:spPr>
+        <p:style>
+          <a:lnRef idx="2">
+            <a:schemeClr val="accent1"/>
+          </a:lnRef>
+          <a:fillRef idx="0">
+            <a:schemeClr val="accent1"/>
+          </a:fillRef>
+          <a:effectRef idx="1">
+            <a:schemeClr val="accent1"/>
+          </a:effectRef>
+          <a:fontRef idx="minor">
+            <a:schemeClr val="tx1"/>
+          </a:fontRef>
+        </p:style>
+      </p:cxnSp>
+      <p:sp>
+        <p:nvSpPr>
+          <p:cNvPr id="12" name="TextBox 11">
+            <a:extLst>
+              <a:ext uri="{FF2B5EF4-FFF2-40B4-BE49-F238E27FC236}">
+                <a16:creationId xmlns:a16="http://schemas.microsoft.com/office/drawing/2014/main" id="{03498D4D-5469-D45F-910B-11BB0FE8C360}"/>
               </a:ext>
             </a:extLst>
           </p:cNvPr>
@@ -4014,8 +4299,8 @@
         </p:nvSpPr>
         <p:spPr>
           <a:xfrm>
-            <a:off x="2477813" y="5228021"/>
-            <a:ext cx="4125311" cy="1200329"/>
+            <a:off x="10101493" y="1731468"/>
+            <a:ext cx="1945084" cy="923330"/>
           </a:xfrm>
           <a:prstGeom prst="rect">
             <a:avLst/>
@@ -4039,17 +4324,17 @@
                   <a:srgbClr val="C00000"/>
                 </a:solidFill>
               </a:rPr>
-              <a:t>A drug can have no, one or more than one assigned ATC code. Click here to open the ATC code network for more detailed information</a:t>
+              <a:t>Click here to see drug information in Drugbank</a:t>
             </a:r>
           </a:p>
         </p:txBody>
       </p:sp>
       <p:cxnSp>
         <p:nvCxnSpPr>
-          <p:cNvPr id="5" name="Straight Arrow Connector 4">
-            <a:extLst>
-              <a:ext uri="{FF2B5EF4-FFF2-40B4-BE49-F238E27FC236}">
-                <a16:creationId xmlns:a16="http://schemas.microsoft.com/office/drawing/2014/main" id="{E9BB30B9-440D-5567-AC7A-BEE6E03E1326}"/>
+          <p:cNvPr id="13" name="Straight Arrow Connector 12">
+            <a:extLst>
+              <a:ext uri="{FF2B5EF4-FFF2-40B4-BE49-F238E27FC236}">
+                <a16:creationId xmlns:a16="http://schemas.microsoft.com/office/drawing/2014/main" id="{55DFAC1D-859A-DE24-0FF8-9FB4AFACBDBA}"/>
               </a:ext>
             </a:extLst>
           </p:cNvPr>
@@ -4059,9 +4344,9 @@
           <p:nvPr/>
         </p:nvCxnSpPr>
         <p:spPr>
-          <a:xfrm flipV="1">
-            <a:off x="3870435" y="4435365"/>
-            <a:ext cx="1058917" cy="792656"/>
+          <a:xfrm flipH="1">
+            <a:off x="9932276" y="2654798"/>
+            <a:ext cx="723445" cy="625906"/>
           </a:xfrm>
           <a:prstGeom prst="straightConnector1">
             <a:avLst/>
@@ -4088,198 +4373,6 @@
           </a:fontRef>
         </p:style>
       </p:cxnSp>
-      <p:sp>
-        <p:nvSpPr>
-          <p:cNvPr id="7" name="TextBox 6">
-            <a:extLst>
-              <a:ext uri="{FF2B5EF4-FFF2-40B4-BE49-F238E27FC236}">
-                <a16:creationId xmlns:a16="http://schemas.microsoft.com/office/drawing/2014/main" id="{AAEE22A6-51DA-6136-8693-D0C7CF0C39C2}"/>
-              </a:ext>
-            </a:extLst>
-          </p:cNvPr>
-          <p:cNvSpPr txBox="1"/>
-          <p:nvPr/>
-        </p:nvSpPr>
-        <p:spPr>
-          <a:xfrm>
-            <a:off x="8187149" y="4981028"/>
-            <a:ext cx="2519855" cy="923330"/>
-          </a:xfrm>
-          <a:prstGeom prst="rect">
-            <a:avLst/>
-          </a:prstGeom>
-          <a:noFill/>
-          <a:ln>
-            <a:solidFill>
-              <a:srgbClr val="C00000"/>
-            </a:solidFill>
-          </a:ln>
-        </p:spPr>
-        <p:txBody>
-          <a:bodyPr wrap="square" rtlCol="0">
-            <a:spAutoFit/>
-          </a:bodyPr>
-          <a:lstStyle/>
-          <a:p>
-            <a:r>
-              <a:rPr lang="en-DK">
-                <a:solidFill>
-                  <a:srgbClr val="C00000"/>
-                </a:solidFill>
-              </a:rPr>
-              <a:t>Click here to see drug information in Drugbank</a:t>
-            </a:r>
-          </a:p>
-        </p:txBody>
-      </p:sp>
-      <p:cxnSp>
-        <p:nvCxnSpPr>
-          <p:cNvPr id="8" name="Straight Arrow Connector 7">
-            <a:extLst>
-              <a:ext uri="{FF2B5EF4-FFF2-40B4-BE49-F238E27FC236}">
-                <a16:creationId xmlns:a16="http://schemas.microsoft.com/office/drawing/2014/main" id="{CF791697-F91A-66F0-0660-BD07ABCDE8AF}"/>
-              </a:ext>
-            </a:extLst>
-          </p:cNvPr>
-          <p:cNvCxnSpPr>
-            <a:cxnSpLocks/>
-          </p:cNvCxnSpPr>
-          <p:nvPr/>
-        </p:nvCxnSpPr>
-        <p:spPr>
-          <a:xfrm flipV="1">
-            <a:off x="9879724" y="4435365"/>
-            <a:ext cx="510655" cy="545663"/>
-          </a:xfrm>
-          <a:prstGeom prst="straightConnector1">
-            <a:avLst/>
-          </a:prstGeom>
-          <a:ln>
-            <a:solidFill>
-              <a:srgbClr val="C00000"/>
-            </a:solidFill>
-            <a:tailEnd type="triangle"/>
-          </a:ln>
-        </p:spPr>
-        <p:style>
-          <a:lnRef idx="2">
-            <a:schemeClr val="accent1"/>
-          </a:lnRef>
-          <a:fillRef idx="0">
-            <a:schemeClr val="accent1"/>
-          </a:fillRef>
-          <a:effectRef idx="1">
-            <a:schemeClr val="accent1"/>
-          </a:effectRef>
-          <a:fontRef idx="minor">
-            <a:schemeClr val="tx1"/>
-          </a:fontRef>
-        </p:style>
-      </p:cxnSp>
-      <p:cxnSp>
-        <p:nvCxnSpPr>
-          <p:cNvPr id="11" name="Straight Arrow Connector 10">
-            <a:extLst>
-              <a:ext uri="{FF2B5EF4-FFF2-40B4-BE49-F238E27FC236}">
-                <a16:creationId xmlns:a16="http://schemas.microsoft.com/office/drawing/2014/main" id="{D754D501-FF05-FDBD-8B7F-AAC0F675C34B}"/>
-              </a:ext>
-            </a:extLst>
-          </p:cNvPr>
-          <p:cNvCxnSpPr>
-            <a:cxnSpLocks/>
-          </p:cNvCxnSpPr>
-          <p:nvPr/>
-        </p:nvCxnSpPr>
-        <p:spPr>
-          <a:xfrm flipH="1">
-            <a:off x="3647090" y="1418897"/>
-            <a:ext cx="515007" cy="935420"/>
-          </a:xfrm>
-          <a:prstGeom prst="straightConnector1">
-            <a:avLst/>
-          </a:prstGeom>
-          <a:ln>
-            <a:solidFill>
-              <a:srgbClr val="C00000"/>
-            </a:solidFill>
-            <a:tailEnd type="triangle"/>
-          </a:ln>
-        </p:spPr>
-        <p:style>
-          <a:lnRef idx="2">
-            <a:schemeClr val="accent1"/>
-          </a:lnRef>
-          <a:fillRef idx="0">
-            <a:schemeClr val="accent1"/>
-          </a:fillRef>
-          <a:effectRef idx="1">
-            <a:schemeClr val="accent1"/>
-          </a:effectRef>
-          <a:fontRef idx="minor">
-            <a:schemeClr val="tx1"/>
-          </a:fontRef>
-        </p:style>
-      </p:cxnSp>
-      <p:sp>
-        <p:nvSpPr>
-          <p:cNvPr id="15" name="TextBox 14">
-            <a:extLst>
-              <a:ext uri="{FF2B5EF4-FFF2-40B4-BE49-F238E27FC236}">
-                <a16:creationId xmlns:a16="http://schemas.microsoft.com/office/drawing/2014/main" id="{007D3E2D-F941-3048-A2F5-06CF6EB8D6C5}"/>
-              </a:ext>
-            </a:extLst>
-          </p:cNvPr>
-          <p:cNvSpPr txBox="1"/>
-          <p:nvPr/>
-        </p:nvSpPr>
-        <p:spPr>
-          <a:xfrm>
-            <a:off x="4162097" y="601108"/>
-            <a:ext cx="5364626" cy="923330"/>
-          </a:xfrm>
-          <a:prstGeom prst="rect">
-            <a:avLst/>
-          </a:prstGeom>
-          <a:noFill/>
-          <a:ln>
-            <a:solidFill>
-              <a:srgbClr val="C00000"/>
-            </a:solidFill>
-          </a:ln>
-        </p:spPr>
-        <p:txBody>
-          <a:bodyPr wrap="square" rtlCol="0">
-            <a:spAutoFit/>
-          </a:bodyPr>
-          <a:lstStyle/>
-          <a:p>
-            <a:r>
-              <a:rPr lang="en-DK">
-                <a:solidFill>
-                  <a:srgbClr val="C00000"/>
-                </a:solidFill>
-              </a:rPr>
-              <a:t>Use this search box to find a drug from its Drugbank ID or name. </a:t>
-            </a:r>
-            <a:r>
-              <a:rPr lang="vi-VN">
-                <a:solidFill>
-                  <a:srgbClr val="C00000"/>
-                </a:solidFill>
-              </a:rPr>
-              <a:t>Autocomplete feature suggests possible matches as the user types.</a:t>
-            </a:r>
-            <a:r>
-              <a:rPr lang="en-DK">
-                <a:solidFill>
-                  <a:srgbClr val="C00000"/>
-                </a:solidFill>
-              </a:rPr>
-              <a:t> </a:t>
-            </a:r>
-          </a:p>
-        </p:txBody>
-      </p:sp>
     </p:spTree>
     <p:extLst>
       <p:ext uri="{BB962C8B-B14F-4D97-AF65-F5344CB8AC3E}">

</xml_diff>